<commit_message>
Update TCP/IP protocol design
</commit_message>
<xml_diff>
--- a/Designing Application Protocols for TCPIP/Protocol Design.pptx
+++ b/Designing Application Protocols for TCPIP/Protocol Design.pptx
@@ -299,7 +299,7 @@
           <a:p>
             <a:fld id="{574E8BCA-0B4F-4373-B78E-3D2899449797}" type="datetimeFigureOut">
               <a:rPr lang="en-US" smtClean="0"/>
-              <a:t>3/21/2024</a:t>
+              <a:t>4/17/2024</a:t>
             </a:fld>
             <a:endParaRPr lang="en-US" dirty="0"/>
           </a:p>
@@ -906,61 +906,7 @@
           <a:p>
             <a:r>
               <a:rPr lang="en-US" dirty="0"/>
-              <a:t>I have personally found bugs in:</a:t>
-            </a:r>
-          </a:p>
-          <a:p>
-            <a:pPr marL="171450" indent="-171450">
-              <a:buFontTx/>
-              <a:buChar char="-"/>
-            </a:pPr>
-            <a:r>
-              <a:rPr lang="en-US" dirty="0"/>
-              <a:t>VCL socket (precursor of .NET Socket)</a:t>
-            </a:r>
-          </a:p>
-          <a:p>
-            <a:pPr marL="171450" indent="-171450">
-              <a:buFontTx/>
-              <a:buChar char="-"/>
-            </a:pPr>
-            <a:r>
-              <a:rPr lang="en-US" dirty="0"/>
-              <a:t>MFC socket classes (multiple bugs, not reported)</a:t>
-            </a:r>
-          </a:p>
-          <a:p>
-            <a:pPr marL="171450" indent="-171450">
-              <a:buFontTx/>
-              <a:buChar char="-"/>
-            </a:pPr>
-            <a:endParaRPr lang="en-US" dirty="0"/>
-          </a:p>
-          <a:p>
-            <a:pPr marL="0" indent="0">
-              <a:buFontTx/>
-              <a:buNone/>
-            </a:pPr>
-            <a:r>
-              <a:rPr lang="en-US" dirty="0"/>
-              <a:t>Finding bugs in socket wrappers is really annoying.</a:t>
-            </a:r>
-          </a:p>
-          <a:p>
-            <a:pPr marL="0" indent="0">
-              <a:buFontTx/>
-              <a:buNone/>
-            </a:pPr>
-            <a:endParaRPr lang="en-US" dirty="0"/>
-          </a:p>
-          <a:p>
-            <a:pPr marL="0" indent="0">
-              <a:buFontTx/>
-              <a:buNone/>
-            </a:pPr>
-            <a:r>
-              <a:rPr lang="en-US" dirty="0"/>
-              <a:t>Berkeley has one API for both UDP and TCP.</a:t>
+              <a:t>AKA: Tips for implementing your server/client.</a:t>
             </a:r>
           </a:p>
         </p:txBody>
@@ -982,7 +928,7 @@
           <a:p>
             <a:fld id="{94CE3395-F8FF-4336-B2AA-E15575B990E7}" type="slidenum">
               <a:rPr lang="en-US" smtClean="0"/>
-              <a:t>15</a:t>
+              <a:t>14</a:t>
             </a:fld>
             <a:endParaRPr lang="en-US" dirty="0"/>
           </a:p>
@@ -991,7 +937,7 @@
     </p:spTree>
     <p:extLst>
       <p:ext uri="{BB962C8B-B14F-4D97-AF65-F5344CB8AC3E}">
-        <p14:creationId xmlns:p14="http://schemas.microsoft.com/office/powerpoint/2010/main" val="2336640298"/>
+        <p14:creationId xmlns:p14="http://schemas.microsoft.com/office/powerpoint/2010/main" val="2327398956"/>
       </p:ext>
     </p:extLst>
   </p:cSld>
@@ -1047,7 +993,61 @@
           <a:p>
             <a:r>
               <a:rPr lang="en-US" dirty="0"/>
-              <a:t>(skipping Connect/Listen, which are pretty straightforward)</a:t>
+              <a:t>I have personally found bugs in:</a:t>
+            </a:r>
+          </a:p>
+          <a:p>
+            <a:pPr marL="171450" indent="-171450">
+              <a:buFontTx/>
+              <a:buChar char="-"/>
+            </a:pPr>
+            <a:r>
+              <a:rPr lang="en-US" dirty="0"/>
+              <a:t>VCL socket (precursor of .NET Socket)</a:t>
+            </a:r>
+          </a:p>
+          <a:p>
+            <a:pPr marL="171450" indent="-171450">
+              <a:buFontTx/>
+              <a:buChar char="-"/>
+            </a:pPr>
+            <a:r>
+              <a:rPr lang="en-US" dirty="0"/>
+              <a:t>MFC socket classes (multiple bugs, not reported)</a:t>
+            </a:r>
+          </a:p>
+          <a:p>
+            <a:pPr marL="171450" indent="-171450">
+              <a:buFontTx/>
+              <a:buChar char="-"/>
+            </a:pPr>
+            <a:endParaRPr lang="en-US" dirty="0"/>
+          </a:p>
+          <a:p>
+            <a:pPr marL="0" indent="0">
+              <a:buFontTx/>
+              <a:buNone/>
+            </a:pPr>
+            <a:r>
+              <a:rPr lang="en-US" dirty="0"/>
+              <a:t>Finding bugs in socket wrappers is really annoying.</a:t>
+            </a:r>
+          </a:p>
+          <a:p>
+            <a:pPr marL="0" indent="0">
+              <a:buFontTx/>
+              <a:buNone/>
+            </a:pPr>
+            <a:endParaRPr lang="en-US" dirty="0"/>
+          </a:p>
+          <a:p>
+            <a:pPr marL="0" indent="0">
+              <a:buFontTx/>
+              <a:buNone/>
+            </a:pPr>
+            <a:r>
+              <a:rPr lang="en-US" dirty="0"/>
+              <a:t>Berkeley has one API for both UDP and TCP.</a:t>
             </a:r>
           </a:p>
         </p:txBody>
@@ -1069,7 +1069,7 @@
           <a:p>
             <a:fld id="{94CE3395-F8FF-4336-B2AA-E15575B990E7}" type="slidenum">
               <a:rPr lang="en-US" smtClean="0"/>
-              <a:t>16</a:t>
+              <a:t>15</a:t>
             </a:fld>
             <a:endParaRPr lang="en-US" dirty="0"/>
           </a:p>
@@ -1078,7 +1078,7 @@
     </p:spTree>
     <p:extLst>
       <p:ext uri="{BB962C8B-B14F-4D97-AF65-F5344CB8AC3E}">
-        <p14:creationId xmlns:p14="http://schemas.microsoft.com/office/powerpoint/2010/main" val="513066662"/>
+        <p14:creationId xmlns:p14="http://schemas.microsoft.com/office/powerpoint/2010/main" val="2336640298"/>
       </p:ext>
     </p:extLst>
   </p:cSld>
@@ -1134,7 +1134,7 @@
           <a:p>
             <a:r>
               <a:rPr lang="en-US" dirty="0"/>
-              <a:t>Finally!</a:t>
+              <a:t>(skipping Connect/Listen, which are pretty straightforward)</a:t>
             </a:r>
           </a:p>
         </p:txBody>
@@ -1156,7 +1156,7 @@
           <a:p>
             <a:fld id="{94CE3395-F8FF-4336-B2AA-E15575B990E7}" type="slidenum">
               <a:rPr lang="en-US" smtClean="0"/>
-              <a:t>17</a:t>
+              <a:t>16</a:t>
             </a:fld>
             <a:endParaRPr lang="en-US" dirty="0"/>
           </a:p>
@@ -1165,7 +1165,7 @@
     </p:spTree>
     <p:extLst>
       <p:ext uri="{BB962C8B-B14F-4D97-AF65-F5344CB8AC3E}">
-        <p14:creationId xmlns:p14="http://schemas.microsoft.com/office/powerpoint/2010/main" val="142611180"/>
+        <p14:creationId xmlns:p14="http://schemas.microsoft.com/office/powerpoint/2010/main" val="513066662"/>
       </p:ext>
     </p:extLst>
   </p:cSld>
@@ -1221,7 +1221,7 @@
           <a:p>
             <a:r>
               <a:rPr lang="en-US" dirty="0"/>
-              <a:t>Not mutually exclusive; one protocol may be partially command/response and partly subscribe/event.</a:t>
+              <a:t>Finally!</a:t>
             </a:r>
           </a:p>
         </p:txBody>
@@ -1243,7 +1243,7 @@
           <a:p>
             <a:fld id="{94CE3395-F8FF-4336-B2AA-E15575B990E7}" type="slidenum">
               <a:rPr lang="en-US" smtClean="0"/>
-              <a:t>18</a:t>
+              <a:t>17</a:t>
             </a:fld>
             <a:endParaRPr lang="en-US" dirty="0"/>
           </a:p>
@@ -1252,7 +1252,7 @@
     </p:spTree>
     <p:extLst>
       <p:ext uri="{BB962C8B-B14F-4D97-AF65-F5344CB8AC3E}">
-        <p14:creationId xmlns:p14="http://schemas.microsoft.com/office/powerpoint/2010/main" val="965975970"/>
+        <p14:creationId xmlns:p14="http://schemas.microsoft.com/office/powerpoint/2010/main" val="142611180"/>
       </p:ext>
     </p:extLst>
   </p:cSld>
@@ -1308,7 +1308,7 @@
           <a:p>
             <a:r>
               <a:rPr lang="en-US" dirty="0"/>
-              <a:t>“Build on established standards”  E.g., Unicode standard has clear meanings for “character”, “code point”, and “encoding”.</a:t>
+              <a:t>Not mutually exclusive; one protocol may be partially command/response and partly subscribe/event.</a:t>
             </a:r>
           </a:p>
           <a:p>
@@ -1317,7 +1317,7 @@
           <a:p>
             <a:r>
               <a:rPr lang="en-US" dirty="0"/>
-              <a:t>“First Contact”  After the connection is established, both sides look the same. However, to establish the connection, a client must connect to a server. 1-to-many does not necessarily mean the “1” side is the server. If you have a 1-to-1 scenario, then one side must be chosen as a server – sometimes it’s more natural to think of one side as a server, but other times it’s just a tossup. Peer-to-peer (many-to-many) scenarios often have all participants acting as both client and server.</a:t>
+              <a:t>FTP is an interesting blend!</a:t>
             </a:r>
           </a:p>
         </p:txBody>
@@ -1339,7 +1339,7 @@
           <a:p>
             <a:fld id="{94CE3395-F8FF-4336-B2AA-E15575B990E7}" type="slidenum">
               <a:rPr lang="en-US" smtClean="0"/>
-              <a:t>19</a:t>
+              <a:t>18</a:t>
             </a:fld>
             <a:endParaRPr lang="en-US" dirty="0"/>
           </a:p>
@@ -1348,7 +1348,7 @@
     </p:spTree>
     <p:extLst>
       <p:ext uri="{BB962C8B-B14F-4D97-AF65-F5344CB8AC3E}">
-        <p14:creationId xmlns:p14="http://schemas.microsoft.com/office/powerpoint/2010/main" val="2547797337"/>
+        <p14:creationId xmlns:p14="http://schemas.microsoft.com/office/powerpoint/2010/main" val="965975970"/>
       </p:ext>
     </p:extLst>
   </p:cSld>
@@ -1404,7 +1404,16 @@
           <a:p>
             <a:r>
               <a:rPr lang="en-US" dirty="0"/>
-              <a:t>IANA: Internet Assigned Numbers Authority</a:t>
+              <a:t>“Build on established standards”  E.g., Unicode standard has clear meanings for “character”, “code point”, and “encoding”.</a:t>
+            </a:r>
+          </a:p>
+          <a:p>
+            <a:endParaRPr lang="en-US" dirty="0"/>
+          </a:p>
+          <a:p>
+            <a:r>
+              <a:rPr lang="en-US" dirty="0"/>
+              <a:t>“First Contact”  After the connection is established, both sides look the same. However, to establish the connection, a client must connect to a server. 1-to-many does not necessarily mean the “1” side is the server. If you have a 1-to-1 scenario, then one side must be chosen as a server – sometimes it’s more natural to think of one side as a server, but other times it’s just a tossup. Peer-to-peer (many-to-many) scenarios often have all participants acting as both client and server.</a:t>
             </a:r>
           </a:p>
         </p:txBody>
@@ -1426,7 +1435,7 @@
           <a:p>
             <a:fld id="{94CE3395-F8FF-4336-B2AA-E15575B990E7}" type="slidenum">
               <a:rPr lang="en-US" smtClean="0"/>
-              <a:t>20</a:t>
+              <a:t>19</a:t>
             </a:fld>
             <a:endParaRPr lang="en-US" dirty="0"/>
           </a:p>
@@ -1435,7 +1444,7 @@
     </p:spTree>
     <p:extLst>
       <p:ext uri="{BB962C8B-B14F-4D97-AF65-F5344CB8AC3E}">
-        <p14:creationId xmlns:p14="http://schemas.microsoft.com/office/powerpoint/2010/main" val="1951782863"/>
+        <p14:creationId xmlns:p14="http://schemas.microsoft.com/office/powerpoint/2010/main" val="2547797337"/>
       </p:ext>
     </p:extLst>
   </p:cSld>
@@ -1491,15 +1500,7 @@
           <a:p>
             <a:r>
               <a:rPr lang="en-US" dirty="0"/>
-              <a:t>The key to designing correct protocols is working around what TCP/IP does </a:t>
-            </a:r>
-            <a:r>
-              <a:rPr lang="en-US" b="1" i="0" dirty="0"/>
-              <a:t>not</a:t>
-            </a:r>
-            <a:r>
-              <a:rPr lang="en-US" dirty="0"/>
-              <a:t> provide.</a:t>
+              <a:t>IANA: Internet Assigned Numbers Authority</a:t>
             </a:r>
           </a:p>
         </p:txBody>
@@ -1521,7 +1522,7 @@
           <a:p>
             <a:fld id="{94CE3395-F8FF-4336-B2AA-E15575B990E7}" type="slidenum">
               <a:rPr lang="en-US" smtClean="0"/>
-              <a:t>22</a:t>
+              <a:t>20</a:t>
             </a:fld>
             <a:endParaRPr lang="en-US" dirty="0"/>
           </a:p>
@@ -1530,7 +1531,7 @@
     </p:spTree>
     <p:extLst>
       <p:ext uri="{BB962C8B-B14F-4D97-AF65-F5344CB8AC3E}">
-        <p14:creationId xmlns:p14="http://schemas.microsoft.com/office/powerpoint/2010/main" val="1866707197"/>
+        <p14:creationId xmlns:p14="http://schemas.microsoft.com/office/powerpoint/2010/main" val="1951782863"/>
       </p:ext>
     </p:extLst>
   </p:cSld>
@@ -1586,7 +1587,15 @@
           <a:p>
             <a:r>
               <a:rPr lang="en-US" dirty="0"/>
-              <a:t>Most of the work designing application protocols is dealing with these two aspects.</a:t>
+              <a:t>The key to designing correct protocols is working around what TCP/IP does </a:t>
+            </a:r>
+            <a:r>
+              <a:rPr lang="en-US" b="1" i="0" dirty="0"/>
+              <a:t>not</a:t>
+            </a:r>
+            <a:r>
+              <a:rPr lang="en-US" dirty="0"/>
+              <a:t> provide.</a:t>
             </a:r>
           </a:p>
         </p:txBody>
@@ -1608,7 +1617,7 @@
           <a:p>
             <a:fld id="{94CE3395-F8FF-4336-B2AA-E15575B990E7}" type="slidenum">
               <a:rPr lang="en-US" smtClean="0"/>
-              <a:t>23</a:t>
+              <a:t>22</a:t>
             </a:fld>
             <a:endParaRPr lang="en-US" dirty="0"/>
           </a:p>
@@ -1617,7 +1626,7 @@
     </p:spTree>
     <p:extLst>
       <p:ext uri="{BB962C8B-B14F-4D97-AF65-F5344CB8AC3E}">
-        <p14:creationId xmlns:p14="http://schemas.microsoft.com/office/powerpoint/2010/main" val="3943585628"/>
+        <p14:creationId xmlns:p14="http://schemas.microsoft.com/office/powerpoint/2010/main" val="1866707197"/>
       </p:ext>
     </p:extLst>
   </p:cSld>
@@ -1757,7 +1766,7 @@
           <a:p>
             <a:r>
               <a:rPr lang="en-US" dirty="0"/>
-              <a:t>Finally!</a:t>
+              <a:t>Most of the work designing application protocols is dealing with these two aspects.</a:t>
             </a:r>
           </a:p>
         </p:txBody>
@@ -1779,7 +1788,7 @@
           <a:p>
             <a:fld id="{94CE3395-F8FF-4336-B2AA-E15575B990E7}" type="slidenum">
               <a:rPr lang="en-US" smtClean="0"/>
-              <a:t>24</a:t>
+              <a:t>23</a:t>
             </a:fld>
             <a:endParaRPr lang="en-US" dirty="0"/>
           </a:p>
@@ -1788,7 +1797,7 @@
     </p:spTree>
     <p:extLst>
       <p:ext uri="{BB962C8B-B14F-4D97-AF65-F5344CB8AC3E}">
-        <p14:creationId xmlns:p14="http://schemas.microsoft.com/office/powerpoint/2010/main" val="3272272730"/>
+        <p14:creationId xmlns:p14="http://schemas.microsoft.com/office/powerpoint/2010/main" val="3943585628"/>
       </p:ext>
     </p:extLst>
   </p:cSld>
@@ -1843,12 +1852,8 @@
           <a:lstStyle/>
           <a:p>
             <a:r>
-              <a:rPr lang="en-US" b="1" dirty="0"/>
-              <a:t>True story:</a:t>
-            </a:r>
-            <a:r>
-              <a:rPr lang="en-US" dirty="0"/>
-              <a:t> I once worked for a company that developed custom client/server software. The original communications code had made this common mistake. However, they were all on dedicated networks with high-end hardware, so the underlying problem only happened very rarely. When it did, the operators would just chalk it up to "that buggy Windows OS" or "another network glitch" and reboot. One of my tasks at this company was to change the communication to include a lot more information; of course, this caused the problem to manifest regularly, and the entire application protocol had to be changed to fix it. The truly amazing thing is that this software had been used in countless 24x7 automation systems for 20 years; it was fundamentally broken and no one noticed.</a:t>
+              <a:rPr lang="en-US" dirty="0"/>
+              <a:t>Finally!</a:t>
             </a:r>
           </a:p>
         </p:txBody>
@@ -1870,7 +1875,7 @@
           <a:p>
             <a:fld id="{94CE3395-F8FF-4336-B2AA-E15575B990E7}" type="slidenum">
               <a:rPr lang="en-US" smtClean="0"/>
-              <a:t>25</a:t>
+              <a:t>24</a:t>
             </a:fld>
             <a:endParaRPr lang="en-US" dirty="0"/>
           </a:p>
@@ -1879,7 +1884,7 @@
     </p:spTree>
     <p:extLst>
       <p:ext uri="{BB962C8B-B14F-4D97-AF65-F5344CB8AC3E}">
-        <p14:creationId xmlns:p14="http://schemas.microsoft.com/office/powerpoint/2010/main" val="3473126235"/>
+        <p14:creationId xmlns:p14="http://schemas.microsoft.com/office/powerpoint/2010/main" val="3272272730"/>
       </p:ext>
     </p:extLst>
   </p:cSld>
@@ -1934,8 +1939,12 @@
           <a:lstStyle/>
           <a:p>
             <a:r>
-              <a:rPr lang="en-US" dirty="0"/>
-              <a:t>Implementation reminder: your length prefix buffer can be split, too!</a:t>
+              <a:rPr lang="en-US" b="1" dirty="0"/>
+              <a:t>True story:</a:t>
+            </a:r>
+            <a:r>
+              <a:rPr lang="en-US" dirty="0"/>
+              <a:t> I once worked for a company that developed custom client/server software. The original communications code had made this common mistake. However, they were all on dedicated networks with high-end hardware, so the underlying problem only happened very rarely. When it did, the operators would just chalk it up to "that buggy Windows OS" or "another network glitch" and reboot. One of my tasks at this company was to change the communication to include a lot more information; of course, this caused the problem to manifest regularly, and the entire application protocol had to be changed to fix it. The truly amazing thing is that this software had been used in countless 24x7 automation systems for 20 years; it was fundamentally broken and no one noticed.</a:t>
             </a:r>
           </a:p>
         </p:txBody>
@@ -1957,7 +1966,7 @@
           <a:p>
             <a:fld id="{94CE3395-F8FF-4336-B2AA-E15575B990E7}" type="slidenum">
               <a:rPr lang="en-US" smtClean="0"/>
-              <a:t>27</a:t>
+              <a:t>25</a:t>
             </a:fld>
             <a:endParaRPr lang="en-US" dirty="0"/>
           </a:p>
@@ -1966,7 +1975,7 @@
     </p:spTree>
     <p:extLst>
       <p:ext uri="{BB962C8B-B14F-4D97-AF65-F5344CB8AC3E}">
-        <p14:creationId xmlns:p14="http://schemas.microsoft.com/office/powerpoint/2010/main" val="3590598671"/>
+        <p14:creationId xmlns:p14="http://schemas.microsoft.com/office/powerpoint/2010/main" val="3473126235"/>
       </p:ext>
     </p:extLst>
   </p:cSld>
@@ -2022,20 +2031,8 @@
           <a:p>
             <a:r>
               <a:rPr lang="en-US" dirty="0"/>
-              <a:t>Google tip: “Half-open” is not the same as “half-closed”.</a:t>
-            </a:r>
-          </a:p>
-          <a:p>
-            <a:endParaRPr lang="en-US" dirty="0"/>
-          </a:p>
-          <a:p>
-            <a:r>
-              <a:rPr lang="en-US" baseline="0" dirty="0"/>
-              <a:t>Rarely seen in test environments but common in the real world.</a:t>
-            </a:r>
-          </a:p>
-          <a:p>
-            <a:endParaRPr lang="en-US" dirty="0"/>
+              <a:t>Implementation reminder: your length prefix buffer can be split, too!</a:t>
+            </a:r>
           </a:p>
         </p:txBody>
       </p:sp>
@@ -2056,7 +2053,7 @@
           <a:p>
             <a:fld id="{94CE3395-F8FF-4336-B2AA-E15575B990E7}" type="slidenum">
               <a:rPr lang="en-US" smtClean="0"/>
-              <a:t>28</a:t>
+              <a:t>27</a:t>
             </a:fld>
             <a:endParaRPr lang="en-US" dirty="0"/>
           </a:p>
@@ -2065,7 +2062,7 @@
     </p:spTree>
     <p:extLst>
       <p:ext uri="{BB962C8B-B14F-4D97-AF65-F5344CB8AC3E}">
-        <p14:creationId xmlns:p14="http://schemas.microsoft.com/office/powerpoint/2010/main" val="488748388"/>
+        <p14:creationId xmlns:p14="http://schemas.microsoft.com/office/powerpoint/2010/main" val="3590598671"/>
       </p:ext>
     </p:extLst>
   </p:cSld>
@@ -2120,51 +2117,21 @@
           <a:lstStyle/>
           <a:p>
             <a:r>
-              <a:rPr lang="en-US" b="1" baseline="0" dirty="0"/>
-              <a:t>True Story: </a:t>
-            </a:r>
+              <a:rPr lang="en-US" dirty="0"/>
+              <a:t>Google tip: “Half-open” is not the same as “half-closed”.</a:t>
+            </a:r>
+          </a:p>
+          <a:p>
+            <a:endParaRPr lang="en-US" dirty="0"/>
+          </a:p>
+          <a:p>
             <a:r>
               <a:rPr lang="en-US" baseline="0" dirty="0"/>
-              <a:t>I once had to write software to control a serial device that operated through a "bridge" device that exposed the serial port over TCP/IP. The company that developed the bridge implemented a simple protocol: they listened for a single TCP/IP connection (from anywhere), and - once the connection was established - sent any data received from the TCP/IP connection to the serial port, and any data received from the serial port to the TCP/IP connection. Of course, they only allowed one TCP/IP connection (otherwise, there could be contention over the serial port), so other connections were refused as long as there was an established connection.</a:t>
-            </a:r>
-          </a:p>
-          <a:p>
-            <a:endParaRPr lang="en-US" baseline="0" dirty="0"/>
-          </a:p>
-          <a:p>
-            <a:r>
-              <a:rPr lang="en-US" baseline="0" dirty="0"/>
-              <a:t>The problem? No keepalives. If the bridge ever ended up in a half-open situation, it would </a:t>
-            </a:r>
-            <a:r>
-              <a:rPr lang="en-US" i="1" baseline="0" dirty="0"/>
-              <a:t>never recover</a:t>
-            </a:r>
-            <a:r>
-              <a:rPr lang="en-US" baseline="0" dirty="0"/>
-              <a:t>; any connection requests would be rejected because the bridge would believe the original connection was still active. The bridge failed during our prototyping; when we brought the root cause to the other company's attention, they were unable to implement a keepalive (the embedded TCP/IP stack didn't support it), so they worked with us in developing a method of remotely resetting the bridge.</a:t>
-            </a:r>
-          </a:p>
-          <a:p>
-            <a:endParaRPr lang="en-US" baseline="0" dirty="0"/>
-          </a:p>
-          <a:p>
-            <a:r>
-              <a:rPr lang="en-US" baseline="0" dirty="0"/>
-              <a:t>It's important to note that we </a:t>
-            </a:r>
-            <a:r>
-              <a:rPr lang="en-US" i="1" baseline="0" dirty="0"/>
-              <a:t>did</a:t>
-            </a:r>
-            <a:r>
-              <a:rPr lang="en-US" baseline="0" dirty="0"/>
-              <a:t> have keepalive testing on our side of the connection (via a timer), but this was insufficient. </a:t>
-            </a:r>
-            <a:r>
-              <a:rPr lang="en-US" b="1" baseline="0" dirty="0"/>
-              <a:t>It is necessary to have keepalive testing on both sides of the connection.</a:t>
-            </a:r>
+              <a:t>Rarely seen in test environments but common in the real world.</a:t>
+            </a:r>
+          </a:p>
+          <a:p>
+            <a:endParaRPr lang="en-US" dirty="0"/>
           </a:p>
         </p:txBody>
       </p:sp>
@@ -2185,7 +2152,7 @@
           <a:p>
             <a:fld id="{94CE3395-F8FF-4336-B2AA-E15575B990E7}" type="slidenum">
               <a:rPr lang="en-US" smtClean="0"/>
-              <a:t>30</a:t>
+              <a:t>28</a:t>
             </a:fld>
             <a:endParaRPr lang="en-US" dirty="0"/>
           </a:p>
@@ -2194,7 +2161,7 @@
     </p:spTree>
     <p:extLst>
       <p:ext uri="{BB962C8B-B14F-4D97-AF65-F5344CB8AC3E}">
-        <p14:creationId xmlns:p14="http://schemas.microsoft.com/office/powerpoint/2010/main" val="3423903346"/>
+        <p14:creationId xmlns:p14="http://schemas.microsoft.com/office/powerpoint/2010/main" val="488748388"/>
       </p:ext>
     </p:extLst>
   </p:cSld>
@@ -2248,7 +2215,52 @@
           <a:bodyPr/>
           <a:lstStyle/>
           <a:p>
-            <a:endParaRPr lang="en-US" dirty="0"/>
+            <a:r>
+              <a:rPr lang="en-US" b="1" baseline="0" dirty="0"/>
+              <a:t>True Story: </a:t>
+            </a:r>
+            <a:r>
+              <a:rPr lang="en-US" baseline="0" dirty="0"/>
+              <a:t>I once had to write software to control a serial device that operated through a "bridge" device that exposed the serial port over TCP/IP. The company that developed the bridge implemented a simple protocol: they listened for a single TCP/IP connection (from anywhere), and - once the connection was established - sent any data received from the TCP/IP connection to the serial port, and any data received from the serial port to the TCP/IP connection. Of course, they only allowed one TCP/IP connection (otherwise, there could be contention over the serial port), so other connections were refused as long as there was an established connection.</a:t>
+            </a:r>
+          </a:p>
+          <a:p>
+            <a:endParaRPr lang="en-US" baseline="0" dirty="0"/>
+          </a:p>
+          <a:p>
+            <a:r>
+              <a:rPr lang="en-US" baseline="0" dirty="0"/>
+              <a:t>The problem? No keepalives. If the bridge ever ended up in a half-open situation, it would </a:t>
+            </a:r>
+            <a:r>
+              <a:rPr lang="en-US" i="1" baseline="0" dirty="0"/>
+              <a:t>never recover</a:t>
+            </a:r>
+            <a:r>
+              <a:rPr lang="en-US" baseline="0" dirty="0"/>
+              <a:t>; any connection requests would be rejected because the bridge would believe the original connection was still active. The bridge failed during our prototyping; when we brought the root cause to the other company's attention, they were unable to implement a keepalive (the embedded TCP/IP stack didn't support it), so they worked with us in developing a method of remotely resetting the bridge.</a:t>
+            </a:r>
+          </a:p>
+          <a:p>
+            <a:endParaRPr lang="en-US" baseline="0" dirty="0"/>
+          </a:p>
+          <a:p>
+            <a:r>
+              <a:rPr lang="en-US" baseline="0" dirty="0"/>
+              <a:t>It's important to note that we </a:t>
+            </a:r>
+            <a:r>
+              <a:rPr lang="en-US" i="1" baseline="0" dirty="0"/>
+              <a:t>did</a:t>
+            </a:r>
+            <a:r>
+              <a:rPr lang="en-US" baseline="0" dirty="0"/>
+              <a:t> have keepalive testing on our side of the connection (via a timer), but this was insufficient. </a:t>
+            </a:r>
+            <a:r>
+              <a:rPr lang="en-US" b="1" baseline="0" dirty="0"/>
+              <a:t>It is necessary to have keepalive testing on both sides of the connection.</a:t>
+            </a:r>
           </a:p>
         </p:txBody>
       </p:sp>
@@ -2269,7 +2281,7 @@
           <a:p>
             <a:fld id="{94CE3395-F8FF-4336-B2AA-E15575B990E7}" type="slidenum">
               <a:rPr lang="en-US" smtClean="0"/>
-              <a:t>32</a:t>
+              <a:t>30</a:t>
             </a:fld>
             <a:endParaRPr lang="en-US" dirty="0"/>
           </a:p>
@@ -2278,7 +2290,7 @@
     </p:spTree>
     <p:extLst>
       <p:ext uri="{BB962C8B-B14F-4D97-AF65-F5344CB8AC3E}">
-        <p14:creationId xmlns:p14="http://schemas.microsoft.com/office/powerpoint/2010/main" val="4054034923"/>
+        <p14:creationId xmlns:p14="http://schemas.microsoft.com/office/powerpoint/2010/main" val="3423903346"/>
       </p:ext>
     </p:extLst>
   </p:cSld>
@@ -2353,7 +2365,7 @@
           <a:p>
             <a:fld id="{94CE3395-F8FF-4336-B2AA-E15575B990E7}" type="slidenum">
               <a:rPr lang="en-US" smtClean="0"/>
-              <a:t>33</a:t>
+              <a:t>32</a:t>
             </a:fld>
             <a:endParaRPr lang="en-US" dirty="0"/>
           </a:p>
@@ -2362,7 +2374,7 @@
     </p:spTree>
     <p:extLst>
       <p:ext uri="{BB962C8B-B14F-4D97-AF65-F5344CB8AC3E}">
-        <p14:creationId xmlns:p14="http://schemas.microsoft.com/office/powerpoint/2010/main" val="3985737206"/>
+        <p14:creationId xmlns:p14="http://schemas.microsoft.com/office/powerpoint/2010/main" val="4054034923"/>
       </p:ext>
     </p:extLst>
   </p:cSld>
@@ -2437,7 +2449,7 @@
           <a:p>
             <a:fld id="{94CE3395-F8FF-4336-B2AA-E15575B990E7}" type="slidenum">
               <a:rPr lang="en-US" smtClean="0"/>
-              <a:t>34</a:t>
+              <a:t>33</a:t>
             </a:fld>
             <a:endParaRPr lang="en-US" dirty="0"/>
           </a:p>
@@ -2446,7 +2458,7 @@
     </p:spTree>
     <p:extLst>
       <p:ext uri="{BB962C8B-B14F-4D97-AF65-F5344CB8AC3E}">
-        <p14:creationId xmlns:p14="http://schemas.microsoft.com/office/powerpoint/2010/main" val="4241117231"/>
+        <p14:creationId xmlns:p14="http://schemas.microsoft.com/office/powerpoint/2010/main" val="3985737206"/>
       </p:ext>
     </p:extLst>
   </p:cSld>
@@ -2521,7 +2533,7 @@
           <a:p>
             <a:fld id="{94CE3395-F8FF-4336-B2AA-E15575B990E7}" type="slidenum">
               <a:rPr lang="en-US" smtClean="0"/>
-              <a:t>35</a:t>
+              <a:t>34</a:t>
             </a:fld>
             <a:endParaRPr lang="en-US" dirty="0"/>
           </a:p>
@@ -2530,7 +2542,7 @@
     </p:spTree>
     <p:extLst>
       <p:ext uri="{BB962C8B-B14F-4D97-AF65-F5344CB8AC3E}">
-        <p14:creationId xmlns:p14="http://schemas.microsoft.com/office/powerpoint/2010/main" val="1305884291"/>
+        <p14:creationId xmlns:p14="http://schemas.microsoft.com/office/powerpoint/2010/main" val="4241117231"/>
       </p:ext>
     </p:extLst>
   </p:cSld>
@@ -2605,7 +2617,7 @@
           <a:p>
             <a:fld id="{94CE3395-F8FF-4336-B2AA-E15575B990E7}" type="slidenum">
               <a:rPr lang="en-US" smtClean="0"/>
-              <a:t>36</a:t>
+              <a:t>35</a:t>
             </a:fld>
             <a:endParaRPr lang="en-US" dirty="0"/>
           </a:p>
@@ -2614,7 +2626,7 @@
     </p:spTree>
     <p:extLst>
       <p:ext uri="{BB962C8B-B14F-4D97-AF65-F5344CB8AC3E}">
-        <p14:creationId xmlns:p14="http://schemas.microsoft.com/office/powerpoint/2010/main" val="1077260525"/>
+        <p14:creationId xmlns:p14="http://schemas.microsoft.com/office/powerpoint/2010/main" val="1305884291"/>
       </p:ext>
     </p:extLst>
   </p:cSld>
@@ -2752,6 +2764,90 @@
           <a:bodyPr/>
           <a:lstStyle/>
           <a:p>
+            <a:endParaRPr lang="en-US" dirty="0"/>
+          </a:p>
+        </p:txBody>
+      </p:sp>
+      <p:sp>
+        <p:nvSpPr>
+          <p:cNvPr id="4" name="Slide Number Placeholder 3"/>
+          <p:cNvSpPr>
+            <a:spLocks noGrp="1"/>
+          </p:cNvSpPr>
+          <p:nvPr>
+            <p:ph type="sldNum" sz="quarter" idx="5"/>
+          </p:nvPr>
+        </p:nvSpPr>
+        <p:spPr/>
+        <p:txBody>
+          <a:bodyPr/>
+          <a:lstStyle/>
+          <a:p>
+            <a:fld id="{94CE3395-F8FF-4336-B2AA-E15575B990E7}" type="slidenum">
+              <a:rPr lang="en-US" smtClean="0"/>
+              <a:t>36</a:t>
+            </a:fld>
+            <a:endParaRPr lang="en-US" dirty="0"/>
+          </a:p>
+        </p:txBody>
+      </p:sp>
+    </p:spTree>
+    <p:extLst>
+      <p:ext uri="{BB962C8B-B14F-4D97-AF65-F5344CB8AC3E}">
+        <p14:creationId xmlns:p14="http://schemas.microsoft.com/office/powerpoint/2010/main" val="1077260525"/>
+      </p:ext>
+    </p:extLst>
+  </p:cSld>
+  <p:clrMapOvr>
+    <a:masterClrMapping/>
+  </p:clrMapOvr>
+</p:notes>
+</file>
+
+<file path=ppt/notesSlides/notesSlide31.xml><?xml version="1.0" encoding="utf-8"?>
+<p:notes xmlns:a="http://schemas.openxmlformats.org/drawingml/2006/main" xmlns:r="http://schemas.openxmlformats.org/officeDocument/2006/relationships" xmlns:p="http://schemas.openxmlformats.org/presentationml/2006/main">
+  <p:cSld>
+    <p:spTree>
+      <p:nvGrpSpPr>
+        <p:cNvPr id="1" name=""/>
+        <p:cNvGrpSpPr/>
+        <p:nvPr/>
+      </p:nvGrpSpPr>
+      <p:grpSpPr>
+        <a:xfrm>
+          <a:off x="0" y="0"/>
+          <a:ext cx="0" cy="0"/>
+          <a:chOff x="0" y="0"/>
+          <a:chExt cx="0" cy="0"/>
+        </a:xfrm>
+      </p:grpSpPr>
+      <p:sp>
+        <p:nvSpPr>
+          <p:cNvPr id="2" name="Slide Image Placeholder 1"/>
+          <p:cNvSpPr>
+            <a:spLocks noGrp="1" noRot="1" noChangeAspect="1"/>
+          </p:cNvSpPr>
+          <p:nvPr>
+            <p:ph type="sldImg"/>
+          </p:nvPr>
+        </p:nvSpPr>
+        <p:spPr/>
+      </p:sp>
+      <p:sp>
+        <p:nvSpPr>
+          <p:cNvPr id="3" name="Notes Placeholder 2"/>
+          <p:cNvSpPr>
+            <a:spLocks noGrp="1"/>
+          </p:cNvSpPr>
+          <p:nvPr>
+            <p:ph type="body" idx="1"/>
+          </p:nvPr>
+        </p:nvSpPr>
+        <p:spPr/>
+        <p:txBody>
+          <a:bodyPr/>
+          <a:lstStyle/>
+          <a:p>
             <a:r>
               <a:rPr lang="en-US" dirty="0"/>
               <a:t>Even if you don’t need it for debugging, you’ll need it to debug other people’s devices.</a:t>
@@ -2795,7 +2891,7 @@
 </p:notes>
 </file>
 
-<file path=ppt/notesSlides/notesSlide31.xml><?xml version="1.0" encoding="utf-8"?>
+<file path=ppt/notesSlides/notesSlide32.xml><?xml version="1.0" encoding="utf-8"?>
 <p:notes xmlns:a="http://schemas.openxmlformats.org/drawingml/2006/main" xmlns:r="http://schemas.openxmlformats.org/officeDocument/2006/relationships" xmlns:p="http://schemas.openxmlformats.org/presentationml/2006/main">
   <p:cSld>
     <p:spTree>
@@ -4596,7 +4692,7 @@
           <a:p>
             <a:fld id="{1906F911-B8F3-1042-B226-54911C0C3F55}" type="datetimeFigureOut">
               <a:rPr lang="en-US" smtClean="0"/>
-              <a:t>3/21/2024</a:t>
+              <a:t>4/17/2024</a:t>
             </a:fld>
             <a:endParaRPr lang="en-US"/>
           </a:p>
@@ -6199,12 +6295,20 @@
             <p:ph type="subTitle" idx="1"/>
           </p:nvPr>
         </p:nvSpPr>
-        <p:spPr/>
+        <p:spPr>
+          <a:xfrm>
+            <a:off x="1524000" y="3602038"/>
+            <a:ext cx="9144000" cy="517065"/>
+          </a:xfrm>
+        </p:spPr>
         <p:txBody>
           <a:bodyPr/>
           <a:lstStyle/>
           <a:p>
-            <a:endParaRPr lang="en-US"/>
+            <a:r>
+              <a:rPr lang="en-US" dirty="0"/>
+              <a:t>What you probably don’t need to know</a:t>
+            </a:r>
           </a:p>
         </p:txBody>
       </p:sp>
@@ -8474,7 +8578,7 @@
         <p:spPr>
           <a:xfrm>
             <a:off x="269239" y="1197324"/>
-            <a:ext cx="11653523" cy="4443396"/>
+            <a:ext cx="11653523" cy="4702891"/>
           </a:xfrm>
         </p:spPr>
         <p:txBody>
@@ -8529,26 +8633,36 @@
             </a:pPr>
             <a:r>
               <a:rPr lang="en-US" dirty="0"/>
+              <a:t>Any abstraction can introduce bugs, especially for unusual corner cases in complex systems.</a:t>
+            </a:r>
+          </a:p>
+          <a:p>
+            <a:pPr marL="1030290" lvl="2" indent="-457200">
+              <a:buFont typeface="Arial" panose="020B0604020202020204" pitchFamily="34" charset="0"/>
+              <a:buChar char="•"/>
+            </a:pPr>
+            <a:r>
+              <a:rPr lang="en-US" dirty="0"/>
               <a:t>However, .NET types are unusually good quality.</a:t>
             </a:r>
           </a:p>
           <a:p>
+            <a:endParaRPr lang="en-US" dirty="0"/>
+          </a:p>
+          <a:p>
+            <a:r>
+              <a:rPr lang="en-US" dirty="0"/>
+              <a:t>But ignore the UDP parts.</a:t>
+            </a:r>
+          </a:p>
+          <a:p>
             <a:pPr marL="796926" lvl="1" indent="-457200">
               <a:buFont typeface="Arial" panose="020B0604020202020204" pitchFamily="34" charset="0"/>
               <a:buChar char="•"/>
             </a:pPr>
             <a:r>
               <a:rPr lang="en-US" dirty="0"/>
-              <a:t>But any abstraction can introduce bugs, especially for unusual corner cases in complex systems.</a:t>
-            </a:r>
-          </a:p>
-          <a:p>
-            <a:endParaRPr lang="en-US" dirty="0"/>
-          </a:p>
-          <a:p>
-            <a:r>
-              <a:rPr lang="en-US" dirty="0"/>
-              <a:t>But ignore the UDP parts.</a:t>
+              <a:t>Remember: streams, not packets.</a:t>
             </a:r>
           </a:p>
           <a:p>
@@ -8558,21 +8672,18 @@
             </a:pPr>
             <a:r>
               <a:rPr lang="en-US" dirty="0"/>
-              <a:t>Remember: streams, not packets.</a:t>
-            </a:r>
-          </a:p>
-          <a:p>
-            <a:pPr marL="796926" lvl="1" indent="-457200">
-              <a:buFont typeface="Arial" panose="020B0604020202020204" pitchFamily="34" charset="0"/>
-              <a:buChar char="•"/>
-            </a:pPr>
-            <a:r>
-              <a:rPr lang="en-US" dirty="0"/>
-              <a:t>Documentation may talk about packets. </a:t>
+              <a:t>Documentation may talk about packets/datagrams.</a:t>
+            </a:r>
+            <a:br>
+              <a:rPr lang="en-US" dirty="0"/>
+            </a:br>
+            <a:r>
+              <a:rPr lang="en-US" dirty="0"/>
+              <a:t>This </a:t>
             </a:r>
             <a:r>
               <a:rPr lang="en-US" i="1" dirty="0"/>
-              <a:t>Does not apply </a:t>
+              <a:t>does not apply </a:t>
             </a:r>
             <a:r>
               <a:rPr lang="en-US" dirty="0"/>
@@ -9970,7 +10081,7 @@
           <a:p>
             <a:r>
               <a:rPr lang="en-US" dirty="0"/>
-              <a:t>Message Framing: Problem</a:t>
+              <a:t>Message Boundaries: Problem</a:t>
             </a:r>
           </a:p>
         </p:txBody>
@@ -11319,7 +11430,7 @@
           <a:p>
             <a:r>
               <a:rPr lang="en-US" dirty="0"/>
-              <a:t>Message Framing: Solutions</a:t>
+              <a:t>Message Boundaries: Solutions</a:t>
             </a:r>
           </a:p>
         </p:txBody>
@@ -11350,7 +11461,10 @@
           <a:bodyPr/>
           <a:lstStyle/>
           <a:p>
-            <a:endParaRPr lang="en-US" dirty="0"/>
+            <a:r>
+              <a:rPr lang="en-US" dirty="0"/>
+              <a:t>“Message Framing”</a:t>
+            </a:r>
           </a:p>
           <a:p>
             <a:r>
@@ -11469,7 +11583,7 @@
           <a:p>
             <a:r>
               <a:rPr lang="en-US" dirty="0"/>
-              <a:t>Keepalives: Problem</a:t>
+              <a:t>Connection State: Problem</a:t>
             </a:r>
           </a:p>
         </p:txBody>
@@ -12289,7 +12403,7 @@
 </file>
 
 <file path=ppt/slides/slide3.xml><?xml version="1.0" encoding="utf-8"?>
-<p:sld xmlns:a="http://schemas.openxmlformats.org/drawingml/2006/main" xmlns:r="http://schemas.openxmlformats.org/officeDocument/2006/relationships" xmlns:p="http://schemas.openxmlformats.org/presentationml/2006/main" showMasterSp="0">
+<p:sld xmlns:a="http://schemas.openxmlformats.org/drawingml/2006/main" xmlns:r="http://schemas.openxmlformats.org/officeDocument/2006/relationships" xmlns:p="http://schemas.openxmlformats.org/presentationml/2006/main" showMasterSp="0" show="0">
   <p:cSld>
     <p:spTree>
       <p:nvGrpSpPr>
@@ -12351,11 +12465,11 @@
   <p:clrMapOvr>
     <a:masterClrMapping/>
   </p:clrMapOvr>
-  <mc:AlternateContent xmlns:mc="http://schemas.openxmlformats.org/markup-compatibility/2006" xmlns:p14="http://schemas.microsoft.com/office/powerpoint/2010/main">
-    <mc:Choice Requires="p14">
+  <mc:AlternateContent xmlns:mc="http://schemas.openxmlformats.org/markup-compatibility/2006">
+    <mc:Choice xmlns:p14="http://schemas.microsoft.com/office/powerpoint/2010/main" Requires="p14">
       <p:transition p14:dur="0"/>
     </mc:Choice>
-    <mc:Fallback xmlns="">
+    <mc:Fallback>
       <p:transition/>
     </mc:Fallback>
   </mc:AlternateContent>
@@ -12402,7 +12516,7 @@
           <a:p>
             <a:r>
               <a:rPr lang="en-US" dirty="0"/>
-              <a:t>Keepalives: Solution</a:t>
+              <a:t>Connection State: Solution</a:t>
             </a:r>
           </a:p>
         </p:txBody>
@@ -15459,7 +15573,7 @@
             </a:pPr>
             <a:r>
               <a:rPr lang="en-US" dirty="0"/>
-              <a:t>Stevens, Volume 1</a:t>
+              <a:t>TCP/IP Illustrated (Stevens), Volume 1</a:t>
             </a:r>
           </a:p>
           <a:p>

</xml_diff>